<commit_message>
add info to first presentation
</commit_message>
<xml_diff>
--- a/Site-Layout-Best-practices_Cross-browsers-implementation.pptx
+++ b/Site-Layout-Best-practices_Cross-browsers-implementation.pptx
@@ -33,31 +33,32 @@
     <p:sldId id="296" r:id="rId30"/>
     <p:sldId id="297" r:id="rId31"/>
     <p:sldId id="298" r:id="rId32"/>
-    <p:sldId id="299" r:id="rId33"/>
-    <p:sldId id="270" r:id="rId34"/>
-    <p:sldId id="271" r:id="rId35"/>
-    <p:sldId id="273" r:id="rId36"/>
+    <p:sldId id="300" r:id="rId33"/>
+    <p:sldId id="299" r:id="rId34"/>
+    <p:sldId id="270" r:id="rId35"/>
+    <p:sldId id="271" r:id="rId36"/>
+    <p:sldId id="273" r:id="rId37"/>
   </p:sldIdLst>
   <p:sldSz cx="12192000" cy="6858000"/>
   <p:notesSz cx="6858000" cy="9144000"/>
   <p:embeddedFontLst>
     <p:embeddedFont>
       <p:font typeface="Calibri" panose="020F0502020204030204" pitchFamily="34" charset="0"/>
-      <p:regular r:id="rId37"/>
-      <p:bold r:id="rId38"/>
-      <p:italic r:id="rId39"/>
-      <p:boldItalic r:id="rId40"/>
+      <p:regular r:id="rId38"/>
+      <p:bold r:id="rId39"/>
+      <p:italic r:id="rId40"/>
+      <p:boldItalic r:id="rId41"/>
     </p:embeddedFont>
     <p:embeddedFont>
       <p:font typeface="Open Sans" panose="020B0604020202020204" charset="0"/>
-      <p:regular r:id="rId41"/>
-      <p:bold r:id="rId42"/>
-      <p:italic r:id="rId43"/>
-      <p:boldItalic r:id="rId44"/>
+      <p:regular r:id="rId42"/>
+      <p:bold r:id="rId43"/>
+      <p:italic r:id="rId44"/>
+      <p:boldItalic r:id="rId45"/>
     </p:embeddedFont>
     <p:embeddedFont>
       <p:font typeface="Proxima Nova Black" panose="020B0604020202020204" charset="0"/>
-      <p:bold r:id="rId45"/>
+      <p:bold r:id="rId46"/>
     </p:embeddedFont>
   </p:embeddedFontLst>
   <p:defaultTextStyle>
@@ -12196,6 +12197,16 @@
             </a:pPr>
             <a:r>
               <a:rPr lang="en-US" dirty="0"/>
+              <a:t>Vendor Prefixes</a:t>
+            </a:r>
+          </a:p>
+          <a:p>
+            <a:pPr marL="342900" indent="-342900">
+              <a:buFont typeface="Arial" panose="020B0604020202020204" pitchFamily="34" charset="0"/>
+              <a:buChar char="•"/>
+            </a:pPr>
+            <a:r>
+              <a:rPr lang="en-US" dirty="0"/>
               <a:t>Prepare For Differences</a:t>
             </a:r>
           </a:p>
@@ -13178,7 +13189,7 @@
         <p:spPr>
           <a:xfrm>
             <a:off x="685800" y="1714502"/>
-            <a:ext cx="9281160" cy="3810000"/>
+            <a:ext cx="5093563" cy="3810000"/>
           </a:xfrm>
         </p:spPr>
         <p:txBody>
@@ -13187,19 +13198,49 @@
           <a:p>
             <a:r>
               <a:rPr lang="en-US" dirty="0"/>
-              <a:t>Again, it’s pretty much impossible to have a design that looks the same on every browser unless it’s extremely basic. </a:t>
-            </a:r>
-          </a:p>
-          <a:p>
-            <a:r>
-              <a:rPr lang="en-US" dirty="0"/>
-              <a:t>Details like forms and typography will likely vary no matter what rules you follow. Your main concern should not be making the design look identical on every browser. </a:t>
-            </a:r>
-          </a:p>
-          <a:p>
-            <a:r>
-              <a:rPr lang="en-US" dirty="0"/>
-              <a:t>Instead, you should make sure that it looks acceptable and is usable without having elements that are out of place or that prevent someone from accessing certain functions.</a:t>
+              <a:t>CSS vendor prefixes, also sometimes known as or </a:t>
+            </a:r>
+            <a:r>
+              <a:rPr lang="en-US" dirty="0">
+                <a:hlinkClick r:id="rId2"/>
+              </a:rPr>
+              <a:t>CSS</a:t>
+            </a:r>
+            <a:r>
+              <a:rPr lang="en-US" dirty="0"/>
+              <a:t> browser prefixes, are a way for browser makers to add support for </a:t>
+            </a:r>
+            <a:r>
+              <a:rPr lang="en-US" dirty="0">
+                <a:hlinkClick r:id="rId3"/>
+              </a:rPr>
+              <a:t>new CSS features</a:t>
+            </a:r>
+            <a:r>
+              <a:rPr lang="en-US" dirty="0"/>
+              <a:t> before those features are fully supported in all browsers. </a:t>
+            </a:r>
+          </a:p>
+          <a:p>
+            <a:r>
+              <a:rPr lang="en-US" dirty="0"/>
+              <a:t>This may be done during a sort of testing and experimentation period where the browser manufacturer is determining exactly how these new CSS features will be implemented. </a:t>
+            </a:r>
+          </a:p>
+          <a:p>
+            <a:r>
+              <a:rPr lang="en-US" dirty="0"/>
+              <a:t>These prefixes became very popular with the rise of </a:t>
+            </a:r>
+            <a:r>
+              <a:rPr lang="en-US" dirty="0">
+                <a:hlinkClick r:id="rId4"/>
+              </a:rPr>
+              <a:t>CSS3</a:t>
+            </a:r>
+            <a:r>
+              <a:rPr lang="en-US" dirty="0"/>
+              <a:t> a few years ago. </a:t>
             </a:r>
           </a:p>
         </p:txBody>
@@ -13253,12 +13294,232 @@
           <a:p>
             <a:r>
               <a:rPr lang="en-US" sz="4400" dirty="0"/>
-              <a:t>Prepare For Differences</a:t>
+              <a:t>Vendor Prefixes</a:t>
             </a:r>
             <a:endParaRPr lang="uk-UA" sz="4400" dirty="0"/>
           </a:p>
         </p:txBody>
       </p:sp>
+      <p:sp>
+        <p:nvSpPr>
+          <p:cNvPr id="3" name="TextBox 2">
+            <a:extLst>
+              <a:ext uri="{FF2B5EF4-FFF2-40B4-BE49-F238E27FC236}">
+                <a16:creationId xmlns:a16="http://schemas.microsoft.com/office/drawing/2014/main" id="{721A736A-9EB4-4343-9488-71D39E552EAE}"/>
+              </a:ext>
+            </a:extLst>
+          </p:cNvPr>
+          <p:cNvSpPr txBox="1"/>
+          <p:nvPr/>
+        </p:nvSpPr>
+        <p:spPr>
+          <a:xfrm>
+            <a:off x="6196614" y="1580225"/>
+            <a:ext cx="4900473" cy="2862322"/>
+          </a:xfrm>
+          <a:prstGeom prst="rect">
+            <a:avLst/>
+          </a:prstGeom>
+          <a:noFill/>
+        </p:spPr>
+        <p:txBody>
+          <a:bodyPr wrap="square" rtlCol="0">
+            <a:spAutoFit/>
+          </a:bodyPr>
+          <a:lstStyle/>
+          <a:p>
+            <a:r>
+              <a:rPr lang="en-US" dirty="0"/>
+              <a:t>The major browsers use the following prefixes:</a:t>
+            </a:r>
+          </a:p>
+          <a:p>
+            <a:endParaRPr lang="en-US" dirty="0"/>
+          </a:p>
+          <a:p>
+            <a:pPr marL="285750" indent="-285750">
+              <a:buFont typeface="Arial" panose="020B0604020202020204" pitchFamily="34" charset="0"/>
+              <a:buChar char="•"/>
+            </a:pPr>
+            <a:r>
+              <a:rPr lang="en-US" dirty="0">
+                <a:highlight>
+                  <a:srgbClr val="C0C0C0"/>
+                </a:highlight>
+              </a:rPr>
+              <a:t>-</a:t>
+            </a:r>
+            <a:r>
+              <a:rPr lang="en-US" dirty="0" err="1">
+                <a:highlight>
+                  <a:srgbClr val="C0C0C0"/>
+                </a:highlight>
+              </a:rPr>
+              <a:t>webkit</a:t>
+            </a:r>
+            <a:r>
+              <a:rPr lang="en-US" dirty="0">
+                <a:highlight>
+                  <a:srgbClr val="C0C0C0"/>
+                </a:highlight>
+              </a:rPr>
+              <a:t>-</a:t>
+            </a:r>
+            <a:r>
+              <a:rPr lang="en-US" dirty="0"/>
+              <a:t> (Chrome, Safari, newer versions of Opera, almost all iOS browsers, basically all </a:t>
+            </a:r>
+            <a:r>
+              <a:rPr lang="en-US" dirty="0" err="1"/>
+              <a:t>WebKit</a:t>
+            </a:r>
+            <a:r>
+              <a:rPr lang="en-US" dirty="0"/>
+              <a:t> based browsers)</a:t>
+            </a:r>
+          </a:p>
+          <a:p>
+            <a:pPr marL="285750" indent="-285750">
+              <a:buFont typeface="Arial" panose="020B0604020202020204" pitchFamily="34" charset="0"/>
+              <a:buChar char="•"/>
+            </a:pPr>
+            <a:r>
+              <a:rPr lang="en-US" dirty="0">
+                <a:highlight>
+                  <a:srgbClr val="C0C0C0"/>
+                </a:highlight>
+              </a:rPr>
+              <a:t>-</a:t>
+            </a:r>
+            <a:r>
+              <a:rPr lang="en-US" dirty="0" err="1">
+                <a:highlight>
+                  <a:srgbClr val="C0C0C0"/>
+                </a:highlight>
+              </a:rPr>
+              <a:t>moz</a:t>
+            </a:r>
+            <a:r>
+              <a:rPr lang="en-US" dirty="0">
+                <a:highlight>
+                  <a:srgbClr val="C0C0C0"/>
+                </a:highlight>
+              </a:rPr>
+              <a:t>-</a:t>
+            </a:r>
+            <a:r>
+              <a:rPr lang="en-US" dirty="0"/>
+              <a:t> (Firefox)</a:t>
+            </a:r>
+          </a:p>
+          <a:p>
+            <a:pPr marL="285750" indent="-285750">
+              <a:buFont typeface="Arial" panose="020B0604020202020204" pitchFamily="34" charset="0"/>
+              <a:buChar char="•"/>
+            </a:pPr>
+            <a:r>
+              <a:rPr lang="en-US" dirty="0">
+                <a:highlight>
+                  <a:srgbClr val="C0C0C0"/>
+                </a:highlight>
+              </a:rPr>
+              <a:t>-o-</a:t>
+            </a:r>
+            <a:r>
+              <a:rPr lang="en-US" dirty="0"/>
+              <a:t> (old, pre-</a:t>
+            </a:r>
+            <a:r>
+              <a:rPr lang="en-US" dirty="0" err="1"/>
+              <a:t>WebKit</a:t>
+            </a:r>
+            <a:r>
+              <a:rPr lang="en-US" dirty="0"/>
+              <a:t> version of Opera)</a:t>
+            </a:r>
+          </a:p>
+          <a:p>
+            <a:pPr marL="285750" indent="-285750">
+              <a:buFont typeface="Arial" panose="020B0604020202020204" pitchFamily="34" charset="0"/>
+              <a:buChar char="•"/>
+            </a:pPr>
+            <a:r>
+              <a:rPr lang="en-US" dirty="0">
+                <a:highlight>
+                  <a:srgbClr val="C0C0C0"/>
+                </a:highlight>
+              </a:rPr>
+              <a:t>-</a:t>
+            </a:r>
+            <a:r>
+              <a:rPr lang="en-US" dirty="0" err="1">
+                <a:highlight>
+                  <a:srgbClr val="C0C0C0"/>
+                </a:highlight>
+              </a:rPr>
+              <a:t>ms</a:t>
+            </a:r>
+            <a:r>
+              <a:rPr lang="en-US" dirty="0">
+                <a:highlight>
+                  <a:srgbClr val="C0C0C0"/>
+                </a:highlight>
+              </a:rPr>
+              <a:t>-</a:t>
+            </a:r>
+            <a:r>
+              <a:rPr lang="en-US" dirty="0"/>
+              <a:t> (Internet Explorer and Microsoft Edge)</a:t>
+            </a:r>
+          </a:p>
+          <a:p>
+            <a:pPr marL="285750" indent="-285750">
+              <a:buFont typeface="Arial" panose="020B0604020202020204" pitchFamily="34" charset="0"/>
+              <a:buChar char="•"/>
+            </a:pPr>
+            <a:endParaRPr lang="en-US" dirty="0"/>
+          </a:p>
+          <a:p>
+            <a:endParaRPr lang="en-US" dirty="0"/>
+          </a:p>
+        </p:txBody>
+      </p:sp>
+      <p:pic>
+        <p:nvPicPr>
+          <p:cNvPr id="12" name="Picture 11">
+            <a:extLst>
+              <a:ext uri="{FF2B5EF4-FFF2-40B4-BE49-F238E27FC236}">
+                <a16:creationId xmlns:a16="http://schemas.microsoft.com/office/drawing/2014/main" id="{F6850214-179C-4B98-A7E6-A9ED7F6D2E7C}"/>
+              </a:ext>
+            </a:extLst>
+          </p:cNvPr>
+          <p:cNvPicPr>
+            <a:picLocks noChangeAspect="1"/>
+          </p:cNvPicPr>
+          <p:nvPr/>
+        </p:nvPicPr>
+        <p:blipFill>
+          <a:blip r:embed="rId5">
+            <a:extLst>
+              <a:ext uri="{28A0092B-C50C-407E-A947-70E740481C1C}">
+                <a14:useLocalDpi xmlns:a14="http://schemas.microsoft.com/office/drawing/2010/main" val="0"/>
+              </a:ext>
+            </a:extLst>
+          </a:blip>
+          <a:stretch>
+            <a:fillRect/>
+          </a:stretch>
+        </p:blipFill>
+        <p:spPr>
+          <a:xfrm>
+            <a:off x="6735607" y="4057652"/>
+            <a:ext cx="3514725" cy="1466850"/>
+          </a:xfrm>
+          <a:prstGeom prst="rect">
+            <a:avLst/>
+          </a:prstGeom>
+        </p:spPr>
+      </p:pic>
     </p:spTree>
     <p:extLst>
       <p:ext uri="{BB962C8B-B14F-4D97-AF65-F5344CB8AC3E}">
@@ -13311,39 +13572,19 @@
           <a:p>
             <a:r>
               <a:rPr lang="en-US" dirty="0"/>
-              <a:t>It’s not just enough to keep these tips in mind while developing. As hard as you try to avoid it, it’s easy to accidentally write something that doesn’t work in one browser. </a:t>
-            </a:r>
-          </a:p>
-          <a:p>
-            <a:r>
-              <a:rPr lang="en-US" dirty="0"/>
-              <a:t>This is why you need to check that the site actually works on different browsers before delivery. </a:t>
-            </a:r>
-          </a:p>
-          <a:p>
-            <a:r>
-              <a:rPr lang="en-US" dirty="0"/>
-              <a:t>Using a tool like </a:t>
-            </a:r>
-            <a:r>
-              <a:rPr lang="en-US" dirty="0" err="1">
-                <a:hlinkClick r:id="rId2"/>
-              </a:rPr>
-              <a:t>CrossBrowserTesting</a:t>
-            </a:r>
-            <a:r>
-              <a:rPr lang="en-US" dirty="0"/>
-              <a:t>  and </a:t>
-            </a:r>
-            <a:r>
-              <a:rPr lang="en-US" dirty="0" err="1">
-                <a:hlinkClick r:id="rId3"/>
-              </a:rPr>
-              <a:t>BrowserStack</a:t>
-            </a:r>
-            <a:r>
-              <a:rPr lang="en-US" dirty="0"/>
-              <a:t> gives you access to do this in over 1,500 browsers, so you never have to wonder what users are seeing when they visit your page from a different machine.</a:t>
+              <a:t>Again, it’s pretty much impossible to have a design that looks the same on every browser unless it’s extremely basic. </a:t>
+            </a:r>
+          </a:p>
+          <a:p>
+            <a:r>
+              <a:rPr lang="en-US" dirty="0"/>
+              <a:t>Details like forms and typography will likely vary no matter what rules you follow. Your main concern should not be making the design look identical on every browser. </a:t>
+            </a:r>
+          </a:p>
+          <a:p>
+            <a:r>
+              <a:rPr lang="en-US" dirty="0"/>
+              <a:t>Instead, you should make sure that it looks acceptable and is usable without having elements that are out of place or that prevent someone from accessing certain functions.</a:t>
             </a:r>
           </a:p>
         </p:txBody>
@@ -13397,7 +13638,7 @@
           <a:p>
             <a:r>
               <a:rPr lang="en-US" sz="4400" dirty="0"/>
-              <a:t>Don’t skip Cross-Browser Testing</a:t>
+              <a:t>Prepare For Differences</a:t>
             </a:r>
             <a:endParaRPr lang="uk-UA" sz="4400" dirty="0"/>
           </a:p>
@@ -13406,7 +13647,7 @@
     </p:spTree>
     <p:extLst>
       <p:ext uri="{BB962C8B-B14F-4D97-AF65-F5344CB8AC3E}">
-        <p14:creationId xmlns:p14="http://schemas.microsoft.com/office/powerpoint/2010/main" val="2429067607"/>
+        <p14:creationId xmlns:p14="http://schemas.microsoft.com/office/powerpoint/2010/main" val="2282422883"/>
       </p:ext>
     </p:extLst>
   </p:cSld>
@@ -13435,31 +13676,122 @@
       </p:grpSpPr>
       <p:sp>
         <p:nvSpPr>
-          <p:cNvPr id="4" name="Title 3"/>
+          <p:cNvPr id="5" name="Text Placeholder 4"/>
           <p:cNvSpPr>
             <a:spLocks noGrp="1"/>
           </p:cNvSpPr>
           <p:nvPr>
-            <p:ph type="title"/>
+            <p:ph type="body" sz="quarter" idx="10"/>
           </p:nvPr>
         </p:nvSpPr>
-        <p:spPr/>
+        <p:spPr>
+          <a:xfrm>
+            <a:off x="685800" y="1714502"/>
+            <a:ext cx="9281160" cy="3810000"/>
+          </a:xfrm>
+        </p:spPr>
         <p:txBody>
           <a:bodyPr/>
           <a:lstStyle/>
           <a:p>
             <a:r>
               <a:rPr lang="en-US" dirty="0"/>
-              <a:t>QUESTIONS ?</a:t>
-            </a:r>
-            <a:endParaRPr lang="uk-UA" dirty="0"/>
+              <a:t>It’s not just enough to keep these tips in mind while developing. As hard as you try to avoid it, it’s easy to accidentally write something that doesn’t work in one browser. </a:t>
+            </a:r>
+          </a:p>
+          <a:p>
+            <a:r>
+              <a:rPr lang="en-US" dirty="0"/>
+              <a:t>This is why you need to check that the site actually works on different browsers before delivery. </a:t>
+            </a:r>
+          </a:p>
+          <a:p>
+            <a:r>
+              <a:rPr lang="en-US" dirty="0"/>
+              <a:t>Using a tool like </a:t>
+            </a:r>
+            <a:r>
+              <a:rPr lang="en-US" dirty="0" err="1">
+                <a:hlinkClick r:id="rId2"/>
+              </a:rPr>
+              <a:t>CrossBrowserTesting</a:t>
+            </a:r>
+            <a:r>
+              <a:rPr lang="en-US" dirty="0"/>
+              <a:t>  and </a:t>
+            </a:r>
+            <a:r>
+              <a:rPr lang="en-US" dirty="0" err="1">
+                <a:hlinkClick r:id="rId3"/>
+              </a:rPr>
+              <a:t>BrowserStack</a:t>
+            </a:r>
+            <a:r>
+              <a:rPr lang="en-US" dirty="0"/>
+              <a:t> gives you access to do this in over 1,500 browsers, so you never have to wonder what users are seeing when they visit your page from a different machine.</a:t>
+            </a:r>
+          </a:p>
+        </p:txBody>
+      </p:sp>
+      <p:sp>
+        <p:nvSpPr>
+          <p:cNvPr id="6" name="Title 3">
+            <a:extLst>
+              <a:ext uri="{FF2B5EF4-FFF2-40B4-BE49-F238E27FC236}">
+                <a16:creationId xmlns:a16="http://schemas.microsoft.com/office/drawing/2014/main" id="{552B119F-E694-4313-ADAC-69A9F9627046}"/>
+              </a:ext>
+            </a:extLst>
+          </p:cNvPr>
+          <p:cNvSpPr txBox="1">
+            <a:spLocks/>
+          </p:cNvSpPr>
+          <p:nvPr/>
+        </p:nvSpPr>
+        <p:spPr>
+          <a:xfrm>
+            <a:off x="685800" y="0"/>
+            <a:ext cx="10820400" cy="1714502"/>
+          </a:xfrm>
+          <a:prstGeom prst="rect">
+            <a:avLst/>
+          </a:prstGeom>
+        </p:spPr>
+        <p:txBody>
+          <a:bodyPr lIns="0" anchor="t">
+            <a:noAutofit/>
+          </a:bodyPr>
+          <a:lstStyle>
+            <a:lvl1pPr algn="l" defTabSz="914400" rtl="0" eaLnBrk="1" latinLnBrk="0" hangingPunct="1">
+              <a:lnSpc>
+                <a:spcPts val="11000"/>
+              </a:lnSpc>
+              <a:spcBef>
+                <a:spcPct val="0"/>
+              </a:spcBef>
+              <a:buNone/>
+              <a:defRPr sz="12500" kern="1200">
+                <a:solidFill>
+                  <a:schemeClr val="tx1"/>
+                </a:solidFill>
+                <a:latin typeface="Proxima Nova Black" panose="02000506030000020004" pitchFamily="50" charset="0"/>
+                <a:ea typeface="+mj-ea"/>
+                <a:cs typeface="+mj-cs"/>
+              </a:defRPr>
+            </a:lvl1pPr>
+          </a:lstStyle>
+          <a:p>
+            <a:r>
+              <a:rPr lang="en-US" sz="4400" dirty="0"/>
+              <a:t>Don’t skip Cross-Browser Testing</a:t>
+            </a:r>
+            <a:endParaRPr lang="uk-UA" sz="4400" dirty="0"/>
           </a:p>
         </p:txBody>
       </p:sp>
     </p:spTree>
     <p:extLst>
       <p:ext uri="{BB962C8B-B14F-4D97-AF65-F5344CB8AC3E}">
-        <p14:creationId xmlns:p14="http://schemas.microsoft.com/office/powerpoint/2010/main" val="221689730"/>
+        <p14:creationId xmlns:p14="http://schemas.microsoft.com/office/powerpoint/2010/main" val="2429067607"/>
       </p:ext>
     </p:extLst>
   </p:cSld>
@@ -13691,6 +14023,59 @@
           <a:p>
             <a:r>
               <a:rPr lang="en-US" dirty="0"/>
+              <a:t>QUESTIONS ?</a:t>
+            </a:r>
+            <a:endParaRPr lang="uk-UA" dirty="0"/>
+          </a:p>
+        </p:txBody>
+      </p:sp>
+    </p:spTree>
+    <p:extLst>
+      <p:ext uri="{BB962C8B-B14F-4D97-AF65-F5344CB8AC3E}">
+        <p14:creationId xmlns:p14="http://schemas.microsoft.com/office/powerpoint/2010/main" val="221689730"/>
+      </p:ext>
+    </p:extLst>
+  </p:cSld>
+  <p:clrMapOvr>
+    <a:masterClrMapping/>
+  </p:clrMapOvr>
+</p:sld>
+</file>
+
+<file path=ppt/slides/slide31.xml><?xml version="1.0" encoding="utf-8"?>
+<p:sld xmlns:a="http://schemas.openxmlformats.org/drawingml/2006/main" xmlns:r="http://schemas.openxmlformats.org/officeDocument/2006/relationships" xmlns:p="http://schemas.openxmlformats.org/presentationml/2006/main">
+  <p:cSld>
+    <p:spTree>
+      <p:nvGrpSpPr>
+        <p:cNvPr id="1" name=""/>
+        <p:cNvGrpSpPr/>
+        <p:nvPr/>
+      </p:nvGrpSpPr>
+      <p:grpSpPr>
+        <a:xfrm>
+          <a:off x="0" y="0"/>
+          <a:ext cx="0" cy="0"/>
+          <a:chOff x="0" y="0"/>
+          <a:chExt cx="0" cy="0"/>
+        </a:xfrm>
+      </p:grpSpPr>
+      <p:sp>
+        <p:nvSpPr>
+          <p:cNvPr id="4" name="Title 3"/>
+          <p:cNvSpPr>
+            <a:spLocks noGrp="1"/>
+          </p:cNvSpPr>
+          <p:nvPr>
+            <p:ph type="title"/>
+          </p:nvPr>
+        </p:nvSpPr>
+        <p:spPr/>
+        <p:txBody>
+          <a:bodyPr/>
+          <a:lstStyle/>
+          <a:p>
+            <a:r>
+              <a:rPr lang="en-US" dirty="0"/>
               <a:t>USED MATERIALS</a:t>
             </a:r>
             <a:endParaRPr lang="uk-UA" dirty="0"/>
@@ -13872,7 +14257,7 @@
 </p:sld>
 </file>
 
-<file path=ppt/slides/slide31.xml><?xml version="1.0" encoding="utf-8"?>
+<file path=ppt/slides/slide32.xml><?xml version="1.0" encoding="utf-8"?>
 <p:sld xmlns:a="http://schemas.openxmlformats.org/drawingml/2006/main" xmlns:r="http://schemas.openxmlformats.org/officeDocument/2006/relationships" xmlns:p="http://schemas.openxmlformats.org/presentationml/2006/main">
   <p:cSld>
     <p:spTree>
@@ -15430,15 +15815,6 @@
 </file>
 
 <file path=customXml/item1.xml><?xml version="1.0" encoding="utf-8"?>
-<?mso-contentType ?>
-<FormTemplates xmlns="http://schemas.microsoft.com/sharepoint/v3/contenttype/forms">
-  <Display>DocumentLibraryForm</Display>
-  <Edit>DocumentLibraryForm</Edit>
-  <New>DocumentLibraryForm</New>
-</FormTemplates>
-</file>
-
-<file path=customXml/item2.xml><?xml version="1.0" encoding="utf-8"?>
 <ct:contentTypeSchema xmlns:ct="http://schemas.microsoft.com/office/2006/metadata/contentType" xmlns:ma="http://schemas.microsoft.com/office/2006/metadata/properties/metaAttributes" ct:_="" ma:_="" ma:contentTypeName="Документ" ma:contentTypeID="0x0101004195FC54A15F344D83577B1CDDD67A5D" ma:contentTypeVersion="9" ma:contentTypeDescription="Создание документа." ma:contentTypeScope="" ma:versionID="961ec8db58076c7d3e9f84b9cd82fd45">
   <xsd:schema xmlns:xsd="http://www.w3.org/2001/XMLSchema" xmlns:xs="http://www.w3.org/2001/XMLSchema" xmlns:p="http://schemas.microsoft.com/office/2006/metadata/properties" xmlns:ns2="341e6018-ac0a-4dfb-8409-db9e0d25502e" xmlns:ns3="835f28f2-30f1-4728-84d2-86d96e143488" targetNamespace="http://schemas.microsoft.com/office/2006/metadata/properties" ma:root="true" ma:fieldsID="bd9f0c80ada20ee560e77d723f3ef44e" ns2:_="" ns3:_="">
     <xsd:import namespace="341e6018-ac0a-4dfb-8409-db9e0d25502e"/>
@@ -15637,6 +16013,15 @@
 </ct:contentTypeSchema>
 </file>
 
+<file path=customXml/item2.xml><?xml version="1.0" encoding="utf-8"?>
+<?mso-contentType ?>
+<FormTemplates xmlns="http://schemas.microsoft.com/sharepoint/v3/contenttype/forms">
+  <Display>DocumentLibraryForm</Display>
+  <Edit>DocumentLibraryForm</Edit>
+  <New>DocumentLibraryForm</New>
+</FormTemplates>
+</file>
+
 <file path=customXml/item3.xml><?xml version="1.0" encoding="utf-8"?>
 <p:properties xmlns:p="http://schemas.microsoft.com/office/2006/metadata/properties" xmlns:xsi="http://www.w3.org/2001/XMLSchema-instance" xmlns:pc="http://schemas.microsoft.com/office/infopath/2007/PartnerControls">
   <documentManagement>
@@ -15646,14 +16031,6 @@
 </file>
 
 <file path=customXml/itemProps1.xml><?xml version="1.0" encoding="utf-8"?>
-<ds:datastoreItem xmlns:ds="http://schemas.openxmlformats.org/officeDocument/2006/customXml" ds:itemID="{296B3B9E-03D8-4766-BF45-6129617CF026}">
-  <ds:schemaRefs>
-    <ds:schemaRef ds:uri="http://schemas.microsoft.com/sharepoint/v3/contenttype/forms"/>
-  </ds:schemaRefs>
-</ds:datastoreItem>
-</file>
-
-<file path=customXml/itemProps2.xml><?xml version="1.0" encoding="utf-8"?>
 <ds:datastoreItem xmlns:ds="http://schemas.openxmlformats.org/officeDocument/2006/customXml" ds:itemID="{CAFDAB34-20E1-438F-BCB2-ECDA5496F36D}">
   <ds:schemaRefs>
     <ds:schemaRef ds:uri="http://schemas.microsoft.com/office/2006/metadata/contentType"/>
@@ -15668,6 +16045,14 @@
     <ds:schemaRef ds:uri="http://purl.org/dc/elements/1.1/"/>
     <ds:schemaRef ds:uri="http://purl.org/dc/terms/"/>
     <ds:schemaRef ds:uri="http://schemas.microsoft.com/internal/obd"/>
+  </ds:schemaRefs>
+</ds:datastoreItem>
+</file>
+
+<file path=customXml/itemProps2.xml><?xml version="1.0" encoding="utf-8"?>
+<ds:datastoreItem xmlns:ds="http://schemas.openxmlformats.org/officeDocument/2006/customXml" ds:itemID="{296B3B9E-03D8-4766-BF45-6129617CF026}">
+  <ds:schemaRefs>
+    <ds:schemaRef ds:uri="http://schemas.microsoft.com/sharepoint/v3/contenttype/forms"/>
   </ds:schemaRefs>
 </ds:datastoreItem>
 </file>

</xml_diff>